<commit_message>
made sample function slightly more robust
</commit_message>
<xml_diff>
--- a/Docs/Presentation/PAWS_presentation.pptx
+++ b/Docs/Presentation/PAWS_presentation.pptx
@@ -5,7 +5,7 @@
     <p:sldMasterId id="2147483648" r:id="rId1"/>
   </p:sldMasterIdLst>
   <p:sldIdLst>
-    <p:sldId id="256" r:id="rId2"/>
+    <p:sldId id="258" r:id="rId2"/>
     <p:sldId id="257" r:id="rId3"/>
   </p:sldIdLst>
   <p:sldSz cx="9144000" cy="6858000" type="screen4x3"/>
@@ -301,7 +301,7 @@
           <a:p>
             <a:fld id="{315F8E45-CAE2-4F4E-909A-1704B9E6D3FE}" type="datetimeFigureOut">
               <a:rPr lang="en-US" smtClean="0"/>
-              <a:t>16/05/15</a:t>
+              <a:t>03/06/15</a:t>
             </a:fld>
             <a:endParaRPr lang="en-US"/>
           </a:p>
@@ -471,7 +471,7 @@
           <a:p>
             <a:fld id="{315F8E45-CAE2-4F4E-909A-1704B9E6D3FE}" type="datetimeFigureOut">
               <a:rPr lang="en-US" smtClean="0"/>
-              <a:t>16/05/15</a:t>
+              <a:t>03/06/15</a:t>
             </a:fld>
             <a:endParaRPr lang="en-US"/>
           </a:p>
@@ -651,7 +651,7 @@
           <a:p>
             <a:fld id="{315F8E45-CAE2-4F4E-909A-1704B9E6D3FE}" type="datetimeFigureOut">
               <a:rPr lang="en-US" smtClean="0"/>
-              <a:t>16/05/15</a:t>
+              <a:t>03/06/15</a:t>
             </a:fld>
             <a:endParaRPr lang="en-US"/>
           </a:p>
@@ -821,7 +821,7 @@
           <a:p>
             <a:fld id="{315F8E45-CAE2-4F4E-909A-1704B9E6D3FE}" type="datetimeFigureOut">
               <a:rPr lang="en-US" smtClean="0"/>
-              <a:t>16/05/15</a:t>
+              <a:t>03/06/15</a:t>
             </a:fld>
             <a:endParaRPr lang="en-US"/>
           </a:p>
@@ -1067,7 +1067,7 @@
           <a:p>
             <a:fld id="{315F8E45-CAE2-4F4E-909A-1704B9E6D3FE}" type="datetimeFigureOut">
               <a:rPr lang="en-US" smtClean="0"/>
-              <a:t>16/05/15</a:t>
+              <a:t>03/06/15</a:t>
             </a:fld>
             <a:endParaRPr lang="en-US"/>
           </a:p>
@@ -1355,7 +1355,7 @@
           <a:p>
             <a:fld id="{315F8E45-CAE2-4F4E-909A-1704B9E6D3FE}" type="datetimeFigureOut">
               <a:rPr lang="en-US" smtClean="0"/>
-              <a:t>16/05/15</a:t>
+              <a:t>03/06/15</a:t>
             </a:fld>
             <a:endParaRPr lang="en-US"/>
           </a:p>
@@ -1777,7 +1777,7 @@
           <a:p>
             <a:fld id="{315F8E45-CAE2-4F4E-909A-1704B9E6D3FE}" type="datetimeFigureOut">
               <a:rPr lang="en-US" smtClean="0"/>
-              <a:t>16/05/15</a:t>
+              <a:t>03/06/15</a:t>
             </a:fld>
             <a:endParaRPr lang="en-US"/>
           </a:p>
@@ -1895,7 +1895,7 @@
           <a:p>
             <a:fld id="{315F8E45-CAE2-4F4E-909A-1704B9E6D3FE}" type="datetimeFigureOut">
               <a:rPr lang="en-US" smtClean="0"/>
-              <a:t>16/05/15</a:t>
+              <a:t>03/06/15</a:t>
             </a:fld>
             <a:endParaRPr lang="en-US"/>
           </a:p>
@@ -1990,7 +1990,7 @@
           <a:p>
             <a:fld id="{315F8E45-CAE2-4F4E-909A-1704B9E6D3FE}" type="datetimeFigureOut">
               <a:rPr lang="en-US" smtClean="0"/>
-              <a:t>16/05/15</a:t>
+              <a:t>03/06/15</a:t>
             </a:fld>
             <a:endParaRPr lang="en-US"/>
           </a:p>
@@ -2267,7 +2267,7 @@
           <a:p>
             <a:fld id="{315F8E45-CAE2-4F4E-909A-1704B9E6D3FE}" type="datetimeFigureOut">
               <a:rPr lang="en-US" smtClean="0"/>
-              <a:t>16/05/15</a:t>
+              <a:t>03/06/15</a:t>
             </a:fld>
             <a:endParaRPr lang="en-US"/>
           </a:p>
@@ -2520,7 +2520,7 @@
           <a:p>
             <a:fld id="{315F8E45-CAE2-4F4E-909A-1704B9E6D3FE}" type="datetimeFigureOut">
               <a:rPr lang="en-US" smtClean="0"/>
-              <a:t>16/05/15</a:t>
+              <a:t>03/06/15</a:t>
             </a:fld>
             <a:endParaRPr lang="en-US"/>
           </a:p>
@@ -2740,7 +2740,7 @@
           <a:p>
             <a:fld id="{315F8E45-CAE2-4F4E-909A-1704B9E6D3FE}" type="datetimeFigureOut">
               <a:rPr lang="en-US" smtClean="0"/>
-              <a:t>16/05/15</a:t>
+              <a:t>03/06/15</a:t>
             </a:fld>
             <a:endParaRPr lang="en-US" dirty="0"/>
           </a:p>
@@ -3101,18 +3101,6 @@
 <file path=ppt/slides/slide1.xml><?xml version="1.0" encoding="utf-8"?>
 <p:sld xmlns:a="http://schemas.openxmlformats.org/drawingml/2006/main" xmlns:r="http://schemas.openxmlformats.org/officeDocument/2006/relationships" xmlns:p="http://schemas.openxmlformats.org/presentationml/2006/main">
   <p:cSld>
-    <p:bg>
-      <p:bgPr>
-        <a:blipFill dpi="0" rotWithShape="1">
-          <a:blip r:embed="rId2"/>
-          <a:srcRect/>
-          <a:stretch>
-            <a:fillRect/>
-          </a:stretch>
-        </a:blipFill>
-        <a:effectLst/>
-      </p:bgPr>
-    </p:bg>
     <p:spTree>
       <p:nvGrpSpPr>
         <p:cNvPr id="1" name=""/>
@@ -3129,7 +3117,7 @@
       </p:grpSpPr>
       <p:sp>
         <p:nvSpPr>
-          <p:cNvPr id="2" name="Title 1"/>
+          <p:cNvPr id="4" name="Title 1"/>
           <p:cNvSpPr>
             <a:spLocks noGrp="1"/>
           </p:cNvSpPr>
@@ -3171,7 +3159,7 @@
       </p:sp>
       <p:sp>
         <p:nvSpPr>
-          <p:cNvPr id="3" name="Subtitle 2"/>
+          <p:cNvPr id="5" name="Subtitle 2"/>
           <p:cNvSpPr>
             <a:spLocks noGrp="1"/>
           </p:cNvSpPr>
@@ -3213,20 +3201,13 @@
     </p:spTree>
     <p:extLst>
       <p:ext uri="{BB962C8B-B14F-4D97-AF65-F5344CB8AC3E}">
-        <p14:creationId xmlns:p14="http://schemas.microsoft.com/office/powerpoint/2010/main" val="3003346859"/>
+        <p14:creationId xmlns:p14="http://schemas.microsoft.com/office/powerpoint/2010/main" val="378239911"/>
       </p:ext>
     </p:extLst>
   </p:cSld>
   <p:clrMapOvr>
     <a:masterClrMapping/>
   </p:clrMapOvr>
-  <p:timing>
-    <p:tnLst>
-      <p:par>
-        <p:cTn xmlns:p14="http://schemas.microsoft.com/office/powerpoint/2010/main" id="1" dur="indefinite" restart="never" nodeType="tmRoot"/>
-      </p:par>
-    </p:tnLst>
-  </p:timing>
 </p:sld>
 </file>
 

</xml_diff>